<commit_message>
Added a page for comments in the presentation
</commit_message>
<xml_diff>
--- a/mobile-sub-info.pptx
+++ b/mobile-sub-info.pptx
@@ -5,7 +5,7 @@
     <p:sldMasterId id="2147483648" r:id="rId1"/>
   </p:sldMasterIdLst>
   <p:notesMasterIdLst>
-    <p:notesMasterId r:id="rId12"/>
+    <p:notesMasterId r:id="rId13"/>
   </p:notesMasterIdLst>
   <p:sldIdLst>
     <p:sldId id="256" r:id="rId2"/>
@@ -18,6 +18,7 @@
     <p:sldId id="270" r:id="rId9"/>
     <p:sldId id="271" r:id="rId10"/>
     <p:sldId id="267" r:id="rId11"/>
+    <p:sldId id="272" r:id="rId12"/>
   </p:sldIdLst>
   <p:sldSz cx="9144000" cy="6858000" type="screen4x3"/>
   <p:notesSz cx="6858000" cy="9144000"/>
@@ -217,7 +218,7 @@
           <a:p>
             <a:fld id="{C9402206-A25D-4AC0-99B3-02E51DE2E605}" type="datetimeFigureOut">
               <a:rPr lang="zh-CN" altLang="en-US" smtClean="0"/>
-              <a:t>2023/10/26</a:t>
+              <a:t>2023/10/31</a:t>
             </a:fld>
             <a:endParaRPr lang="zh-CN" altLang="en-US"/>
           </a:p>
@@ -568,6 +569,111 @@
 </p:notes>
 </file>
 
+<file path=ppt/notesSlides/notesSlide10.xml><?xml version="1.0" encoding="utf-8"?>
+<p:notes xmlns:a="http://schemas.openxmlformats.org/drawingml/2006/main" xmlns:r="http://schemas.openxmlformats.org/officeDocument/2006/relationships" xmlns:p="http://schemas.openxmlformats.org/presentationml/2006/main">
+  <p:cSld>
+    <p:spTree>
+      <p:nvGrpSpPr>
+        <p:cNvPr id="1" name=""/>
+        <p:cNvGrpSpPr/>
+        <p:nvPr/>
+      </p:nvGrpSpPr>
+      <p:grpSpPr>
+        <a:xfrm>
+          <a:off x="0" y="0"/>
+          <a:ext cx="0" cy="0"/>
+          <a:chOff x="0" y="0"/>
+          <a:chExt cx="0" cy="0"/>
+        </a:xfrm>
+      </p:grpSpPr>
+      <p:sp>
+        <p:nvSpPr>
+          <p:cNvPr id="2" name="幻灯片图像占位符 1"/>
+          <p:cNvSpPr>
+            <a:spLocks noGrp="1" noRot="1" noChangeAspect="1"/>
+          </p:cNvSpPr>
+          <p:nvPr>
+            <p:ph type="sldImg"/>
+          </p:nvPr>
+        </p:nvSpPr>
+        <p:spPr/>
+      </p:sp>
+      <p:sp>
+        <p:nvSpPr>
+          <p:cNvPr id="3" name="备注占位符 2"/>
+          <p:cNvSpPr>
+            <a:spLocks noGrp="1"/>
+          </p:cNvSpPr>
+          <p:nvPr>
+            <p:ph type="body" idx="1"/>
+          </p:nvPr>
+        </p:nvSpPr>
+        <p:spPr/>
+        <p:txBody>
+          <a:bodyPr/>
+          <a:lstStyle/>
+          <a:p>
+            <a:r>
+              <a:rPr lang="en-US" altLang="zh-CN" dirty="0"/>
+              <a:t>Shared</a:t>
+            </a:r>
+            <a:r>
+              <a:rPr lang="en-US" altLang="zh-CN" baseline="0" dirty="0"/>
+              <a:t> address cannot be interface </a:t>
+            </a:r>
+            <a:r>
+              <a:rPr lang="en-US" altLang="zh-CN" baseline="0" dirty="0" err="1"/>
+              <a:t>addr</a:t>
+            </a:r>
+            <a:r>
+              <a:rPr lang="en-US" altLang="zh-CN" baseline="0" dirty="0"/>
+              <a:t>. ARP</a:t>
+            </a:r>
+          </a:p>
+          <a:p>
+            <a:r>
+              <a:rPr lang="en-US" altLang="zh-CN" baseline="0" dirty="0"/>
+              <a:t>static configuration for address prefix in enterprise case</a:t>
+            </a:r>
+          </a:p>
+        </p:txBody>
+      </p:sp>
+      <p:sp>
+        <p:nvSpPr>
+          <p:cNvPr id="4" name="灯片编号占位符 3"/>
+          <p:cNvSpPr>
+            <a:spLocks noGrp="1"/>
+          </p:cNvSpPr>
+          <p:nvPr>
+            <p:ph type="sldNum" sz="quarter" idx="10"/>
+          </p:nvPr>
+        </p:nvSpPr>
+        <p:spPr/>
+        <p:txBody>
+          <a:bodyPr/>
+          <a:lstStyle/>
+          <a:p>
+            <a:fld id="{342D1815-E2FF-40F8-942A-F720D3F6F801}" type="slidenum">
+              <a:rPr lang="zh-CN" altLang="en-US" smtClean="0"/>
+              <a:t>11</a:t>
+            </a:fld>
+            <a:endParaRPr lang="zh-CN" altLang="en-US"/>
+          </a:p>
+        </p:txBody>
+      </p:sp>
+    </p:spTree>
+    <p:extLst>
+      <p:ext uri="{BB962C8B-B14F-4D97-AF65-F5344CB8AC3E}">
+        <p14:creationId xmlns:p14="http://schemas.microsoft.com/office/powerpoint/2010/main" val="910744063"/>
+      </p:ext>
+    </p:extLst>
+  </p:cSld>
+  <p:clrMapOvr>
+    <a:masterClrMapping/>
+  </p:clrMapOvr>
+</p:notes>
+</file>
+
 <file path=ppt/notesSlides/notesSlide2.xml><?xml version="1.0" encoding="utf-8"?>
 <p:notes xmlns:a="http://schemas.openxmlformats.org/drawingml/2006/main" xmlns:r="http://schemas.openxmlformats.org/officeDocument/2006/relationships" xmlns:p="http://schemas.openxmlformats.org/presentationml/2006/main">
   <p:cSld>
@@ -1587,7 +1693,7 @@
           <a:p>
             <a:fld id="{530820CF-B880-4189-942D-D702A7CBA730}" type="datetimeFigureOut">
               <a:rPr lang="zh-CN" altLang="en-US" smtClean="0"/>
-              <a:t>2023/10/26</a:t>
+              <a:t>2023/10/31</a:t>
             </a:fld>
             <a:endParaRPr lang="zh-CN" altLang="en-US"/>
           </a:p>
@@ -1750,7 +1856,7 @@
           <a:p>
             <a:fld id="{530820CF-B880-4189-942D-D702A7CBA730}" type="datetimeFigureOut">
               <a:rPr lang="zh-CN" altLang="en-US" smtClean="0"/>
-              <a:t>2023/10/26</a:t>
+              <a:t>2023/10/31</a:t>
             </a:fld>
             <a:endParaRPr lang="zh-CN" altLang="en-US"/>
           </a:p>
@@ -1923,7 +2029,7 @@
           <a:p>
             <a:fld id="{530820CF-B880-4189-942D-D702A7CBA730}" type="datetimeFigureOut">
               <a:rPr lang="zh-CN" altLang="en-US" smtClean="0"/>
-              <a:t>2023/10/26</a:t>
+              <a:t>2023/10/31</a:t>
             </a:fld>
             <a:endParaRPr lang="zh-CN" altLang="en-US"/>
           </a:p>
@@ -2086,7 +2192,7 @@
           <a:p>
             <a:fld id="{530820CF-B880-4189-942D-D702A7CBA730}" type="datetimeFigureOut">
               <a:rPr lang="zh-CN" altLang="en-US" smtClean="0"/>
-              <a:t>2023/10/26</a:t>
+              <a:t>2023/10/31</a:t>
             </a:fld>
             <a:endParaRPr lang="zh-CN" altLang="en-US"/>
           </a:p>
@@ -2326,7 +2432,7 @@
           <a:p>
             <a:fld id="{530820CF-B880-4189-942D-D702A7CBA730}" type="datetimeFigureOut">
               <a:rPr lang="zh-CN" altLang="en-US" smtClean="0"/>
-              <a:t>2023/10/26</a:t>
+              <a:t>2023/10/31</a:t>
             </a:fld>
             <a:endParaRPr lang="zh-CN" altLang="en-US"/>
           </a:p>
@@ -2606,7 +2712,7 @@
           <a:p>
             <a:fld id="{530820CF-B880-4189-942D-D702A7CBA730}" type="datetimeFigureOut">
               <a:rPr lang="zh-CN" altLang="en-US" smtClean="0"/>
-              <a:t>2023/10/26</a:t>
+              <a:t>2023/10/31</a:t>
             </a:fld>
             <a:endParaRPr lang="zh-CN" altLang="en-US"/>
           </a:p>
@@ -3020,7 +3126,7 @@
           <a:p>
             <a:fld id="{530820CF-B880-4189-942D-D702A7CBA730}" type="datetimeFigureOut">
               <a:rPr lang="zh-CN" altLang="en-US" smtClean="0"/>
-              <a:t>2023/10/26</a:t>
+              <a:t>2023/10/31</a:t>
             </a:fld>
             <a:endParaRPr lang="zh-CN" altLang="en-US"/>
           </a:p>
@@ -3132,7 +3238,7 @@
           <a:p>
             <a:fld id="{530820CF-B880-4189-942D-D702A7CBA730}" type="datetimeFigureOut">
               <a:rPr lang="zh-CN" altLang="en-US" smtClean="0"/>
-              <a:t>2023/10/26</a:t>
+              <a:t>2023/10/31</a:t>
             </a:fld>
             <a:endParaRPr lang="zh-CN" altLang="en-US"/>
           </a:p>
@@ -3222,7 +3328,7 @@
           <a:p>
             <a:fld id="{530820CF-B880-4189-942D-D702A7CBA730}" type="datetimeFigureOut">
               <a:rPr lang="zh-CN" altLang="en-US" smtClean="0"/>
-              <a:t>2023/10/26</a:t>
+              <a:t>2023/10/31</a:t>
             </a:fld>
             <a:endParaRPr lang="zh-CN" altLang="en-US"/>
           </a:p>
@@ -3492,7 +3598,7 @@
           <a:p>
             <a:fld id="{530820CF-B880-4189-942D-D702A7CBA730}" type="datetimeFigureOut">
               <a:rPr lang="zh-CN" altLang="en-US" smtClean="0"/>
-              <a:t>2023/10/26</a:t>
+              <a:t>2023/10/31</a:t>
             </a:fld>
             <a:endParaRPr lang="zh-CN" altLang="en-US"/>
           </a:p>
@@ -3739,7 +3845,7 @@
           <a:p>
             <a:fld id="{530820CF-B880-4189-942D-D702A7CBA730}" type="datetimeFigureOut">
               <a:rPr lang="zh-CN" altLang="en-US" smtClean="0"/>
-              <a:t>2023/10/26</a:t>
+              <a:t>2023/10/31</a:t>
             </a:fld>
             <a:endParaRPr lang="zh-CN" altLang="en-US"/>
           </a:p>
@@ -3945,7 +4051,7 @@
           <a:p>
             <a:fld id="{530820CF-B880-4189-942D-D702A7CBA730}" type="datetimeFigureOut">
               <a:rPr lang="zh-CN" altLang="en-US" smtClean="0"/>
-              <a:t>2023/10/26</a:t>
+              <a:t>2023/10/31</a:t>
             </a:fld>
             <a:endParaRPr lang="zh-CN" altLang="en-US"/>
           </a:p>
@@ -4526,6 +4632,114 @@
     <p:extLst>
       <p:ext uri="{BB962C8B-B14F-4D97-AF65-F5344CB8AC3E}">
         <p14:creationId xmlns:p14="http://schemas.microsoft.com/office/powerpoint/2010/main" val="445745593"/>
+      </p:ext>
+    </p:extLst>
+  </p:cSld>
+  <p:clrMapOvr>
+    <a:masterClrMapping/>
+  </p:clrMapOvr>
+</p:sld>
+</file>
+
+<file path=ppt/slides/slide11.xml><?xml version="1.0" encoding="utf-8"?>
+<p:sld xmlns:a="http://schemas.openxmlformats.org/drawingml/2006/main" xmlns:r="http://schemas.openxmlformats.org/officeDocument/2006/relationships" xmlns:p="http://schemas.openxmlformats.org/presentationml/2006/main">
+  <p:cSld>
+    <p:spTree>
+      <p:nvGrpSpPr>
+        <p:cNvPr id="1" name=""/>
+        <p:cNvGrpSpPr/>
+        <p:nvPr/>
+      </p:nvGrpSpPr>
+      <p:grpSpPr>
+        <a:xfrm>
+          <a:off x="0" y="0"/>
+          <a:ext cx="0" cy="0"/>
+          <a:chOff x="0" y="0"/>
+          <a:chExt cx="0" cy="0"/>
+        </a:xfrm>
+      </p:grpSpPr>
+      <p:sp>
+        <p:nvSpPr>
+          <p:cNvPr id="2" name="标题 1"/>
+          <p:cNvSpPr>
+            <a:spLocks noGrp="1"/>
+          </p:cNvSpPr>
+          <p:nvPr>
+            <p:ph type="title"/>
+          </p:nvPr>
+        </p:nvSpPr>
+        <p:spPr/>
+        <p:txBody>
+          <a:bodyPr>
+            <a:normAutofit/>
+          </a:bodyPr>
+          <a:lstStyle/>
+          <a:p>
+            <a:r>
+              <a:rPr lang="en-US" altLang="zh-CN" dirty="0"/>
+              <a:t>Open Area</a:t>
+            </a:r>
+            <a:endParaRPr lang="zh-CN" altLang="en-US" dirty="0"/>
+          </a:p>
+        </p:txBody>
+      </p:sp>
+      <p:sp>
+        <p:nvSpPr>
+          <p:cNvPr id="3" name="内容占位符 2"/>
+          <p:cNvSpPr>
+            <a:spLocks noGrp="1"/>
+          </p:cNvSpPr>
+          <p:nvPr>
+            <p:ph idx="1"/>
+          </p:nvPr>
+        </p:nvSpPr>
+        <p:spPr>
+          <a:xfrm>
+            <a:off x="457200" y="1639341"/>
+            <a:ext cx="8363272" cy="4525963"/>
+          </a:xfrm>
+        </p:spPr>
+        <p:txBody>
+          <a:bodyPr>
+            <a:normAutofit/>
+          </a:bodyPr>
+          <a:lstStyle/>
+          <a:p>
+            <a:r>
+              <a:rPr lang="en-US" altLang="zh-CN" dirty="0">
+                <a:solidFill>
+                  <a:srgbClr val="002060"/>
+                </a:solidFill>
+              </a:rPr>
+              <a:t>Questions?</a:t>
+            </a:r>
+          </a:p>
+          <a:p>
+            <a:endParaRPr lang="en-US" altLang="zh-CN" dirty="0">
+              <a:solidFill>
+                <a:srgbClr val="002060"/>
+              </a:solidFill>
+            </a:endParaRPr>
+          </a:p>
+          <a:p>
+            <a:r>
+              <a:rPr lang="en-US" altLang="zh-CN" dirty="0">
+                <a:solidFill>
+                  <a:srgbClr val="002060"/>
+                </a:solidFill>
+              </a:rPr>
+              <a:t>Next Step?</a:t>
+            </a:r>
+          </a:p>
+          <a:p>
+            <a:endParaRPr lang="en-US" altLang="zh-CN" dirty="0"/>
+          </a:p>
+        </p:txBody>
+      </p:sp>
+    </p:spTree>
+    <p:extLst>
+      <p:ext uri="{BB962C8B-B14F-4D97-AF65-F5344CB8AC3E}">
+        <p14:creationId xmlns:p14="http://schemas.microsoft.com/office/powerpoint/2010/main" val="1204362849"/>
       </p:ext>
     </p:extLst>
   </p:cSld>

</xml_diff>